<commit_message>
ISO, Part i COLUMNSTORE
</commit_message>
<xml_diff>
--- a/DEVSQL_09_IsolationLevels/DEVSQL_09_IsolationLevels.pptx
+++ b/DEVSQL_09_IsolationLevels/DEVSQL_09_IsolationLevels.pptx
@@ -235,7 +235,7 @@
           <a:p>
             <a:fld id="{A72FB546-F199-4B4F-99BF-57E72CB8BE0D}" type="datetimeFigureOut">
               <a:rPr lang="en-GB" smtClean="0"/>
-              <a:t>25/10/2018</a:t>
+              <a:t>01/08/2019</a:t>
             </a:fld>
             <a:endParaRPr lang="en-GB"/>
           </a:p>
@@ -727,7 +727,7 @@
           <a:p>
             <a:fld id="{B6531FF5-A045-44CD-B615-73078DCBFAD6}" type="datetime1">
               <a:rPr lang="en-US" smtClean="0"/>
-              <a:t>10/25/2018</a:t>
+              <a:t>8/1/2019</a:t>
             </a:fld>
             <a:endParaRPr lang="en-US" dirty="0"/>
           </a:p>
@@ -902,7 +902,7 @@
           <a:p>
             <a:fld id="{E13F3E65-B065-43A2-83A7-45FC00B455BE}" type="datetime1">
               <a:rPr lang="en-US" smtClean="0"/>
-              <a:t>10/25/2018</a:t>
+              <a:t>8/1/2019</a:t>
             </a:fld>
             <a:endParaRPr lang="en-US" dirty="0"/>
           </a:p>
@@ -1086,7 +1086,7 @@
           <a:p>
             <a:fld id="{8A9A0630-62DD-4C73-8A40-A60B91B6A511}" type="datetime1">
               <a:rPr lang="en-US" smtClean="0"/>
-              <a:t>10/25/2018</a:t>
+              <a:t>8/1/2019</a:t>
             </a:fld>
             <a:endParaRPr lang="en-US" dirty="0"/>
           </a:p>
@@ -1260,7 +1260,7 @@
           <a:p>
             <a:fld id="{63465371-8A18-418B-B326-ABE8498DEB70}" type="datetime1">
               <a:rPr lang="en-US" smtClean="0"/>
-              <a:t>10/25/2018</a:t>
+              <a:t>8/1/2019</a:t>
             </a:fld>
             <a:endParaRPr lang="en-US" dirty="0"/>
           </a:p>
@@ -1522,7 +1522,7 @@
           <a:p>
             <a:fld id="{25DDFFFA-CC4F-4C93-A5DC-9C8A23005478}" type="datetime1">
               <a:rPr lang="en-US" smtClean="0"/>
-              <a:t>10/25/2018</a:t>
+              <a:t>8/1/2019</a:t>
             </a:fld>
             <a:endParaRPr lang="en-US" dirty="0"/>
           </a:p>
@@ -1815,7 +1815,7 @@
           <a:p>
             <a:fld id="{DF230267-41B0-44EB-B55A-108D7E48530D}" type="datetime1">
               <a:rPr lang="en-US" smtClean="0"/>
-              <a:t>10/25/2018</a:t>
+              <a:t>8/1/2019</a:t>
             </a:fld>
             <a:endParaRPr lang="en-US" dirty="0"/>
           </a:p>
@@ -2261,7 +2261,7 @@
           <a:p>
             <a:fld id="{7C8DB663-1BFE-4AB0-9E9F-62E621E96E38}" type="datetime1">
               <a:rPr lang="en-US" smtClean="0"/>
-              <a:t>10/25/2018</a:t>
+              <a:t>8/1/2019</a:t>
             </a:fld>
             <a:endParaRPr lang="en-US" dirty="0"/>
           </a:p>
@@ -2383,7 +2383,7 @@
           <a:p>
             <a:fld id="{057A6D43-AA47-4C84-AD98-03F832F99502}" type="datetime1">
               <a:rPr lang="en-US" smtClean="0"/>
-              <a:t>10/25/2018</a:t>
+              <a:t>8/1/2019</a:t>
             </a:fld>
             <a:endParaRPr lang="en-US" dirty="0"/>
           </a:p>
@@ -2482,7 +2482,7 @@
           <a:p>
             <a:fld id="{31F1ACF9-D349-4A71-8B77-B052B66D18BD}" type="datetime1">
               <a:rPr lang="en-US" smtClean="0"/>
-              <a:t>10/25/2018</a:t>
+              <a:t>8/1/2019</a:t>
             </a:fld>
             <a:endParaRPr lang="en-US" dirty="0"/>
           </a:p>
@@ -2774,7 +2774,7 @@
           <a:p>
             <a:fld id="{A352488F-80F6-4E7E-813C-6FCAAB365367}" type="datetime1">
               <a:rPr lang="en-US" smtClean="0"/>
-              <a:t>10/25/2018</a:t>
+              <a:t>8/1/2019</a:t>
             </a:fld>
             <a:endParaRPr lang="en-US" dirty="0"/>
           </a:p>
@@ -3052,7 +3052,7 @@
           <a:p>
             <a:fld id="{B5C41E1E-C80C-4761-B676-7EF590798669}" type="datetime1">
               <a:rPr lang="en-US" smtClean="0"/>
-              <a:t>10/25/2018</a:t>
+              <a:t>8/1/2019</a:t>
             </a:fld>
             <a:endParaRPr lang="en-US" dirty="0"/>
           </a:p>
@@ -3354,7 +3354,7 @@
           <a:p>
             <a:fld id="{0A86CF1F-ABAE-446E-8C92-75371DD18464}" type="datetime1">
               <a:rPr lang="en-US" smtClean="0"/>
-              <a:t>10/25/2018</a:t>
+              <a:t>8/1/2019</a:t>
             </a:fld>
             <a:endParaRPr lang="en-US" dirty="0"/>
           </a:p>

</xml_diff>